<commit_message>
Readme with pictures & slides
</commit_message>
<xml_diff>
--- a/docs/files/Memory levels.pptx
+++ b/docs/files/Memory levels.pptx
@@ -1071,6 +1071,13 @@
         </dgm:presLayoutVars>
       </dgm:prSet>
       <dgm:spPr/>
+      <dgm:t>
+        <a:bodyPr/>
+        <a:lstStyle/>
+        <a:p>
+          <a:endParaRPr lang="en-US"/>
+        </a:p>
+      </dgm:t>
     </dgm:pt>
     <dgm:pt modelId="{84D0ACC4-1438-4C46-99E2-168C24418B6E}" type="pres">
       <dgm:prSet presAssocID="{9F56981F-FF5D-4AF3-8A6D-2ED84676BE9C}" presName="hierFlow" presStyleCnt="0"/>
@@ -1112,6 +1119,13 @@
     <dgm:pt modelId="{EC6F81B1-3AA4-47B0-9936-1E98FDD2BFF9}" type="pres">
       <dgm:prSet presAssocID="{456561FA-1A5D-406C-AC66-062953FA9D19}" presName="Name19" presStyleLbl="parChTrans1D2" presStyleIdx="0" presStyleCnt="2"/>
       <dgm:spPr/>
+      <dgm:t>
+        <a:bodyPr/>
+        <a:lstStyle/>
+        <a:p>
+          <a:endParaRPr lang="en-US"/>
+        </a:p>
+      </dgm:t>
     </dgm:pt>
     <dgm:pt modelId="{8B0ABFD7-8B13-473E-B353-F35A6257B44A}" type="pres">
       <dgm:prSet presAssocID="{3F7AB8E9-AEA2-49CF-8537-B54574EACA12}" presName="Name21" presStyleCnt="0"/>
@@ -1135,6 +1149,13 @@
     <dgm:pt modelId="{B2E9F042-09F5-42A9-9333-0FC7B4921029}" type="pres">
       <dgm:prSet presAssocID="{1B89235B-AD92-4C1B-986B-C3610BA4F281}" presName="Name19" presStyleLbl="parChTrans1D3" presStyleIdx="0" presStyleCnt="2"/>
       <dgm:spPr/>
+      <dgm:t>
+        <a:bodyPr/>
+        <a:lstStyle/>
+        <a:p>
+          <a:endParaRPr lang="en-US"/>
+        </a:p>
+      </dgm:t>
     </dgm:pt>
     <dgm:pt modelId="{43A4BA68-8BAA-4D55-811D-D638DFB08314}" type="pres">
       <dgm:prSet presAssocID="{31838588-A327-4AF4-B1F3-95A2075248F8}" presName="Name21" presStyleCnt="0"/>
@@ -1158,6 +1179,13 @@
     <dgm:pt modelId="{041744E7-3F2E-461A-AE9D-1BB6348C0A89}" type="pres">
       <dgm:prSet presAssocID="{99D62E16-FC9D-4748-985E-E9964D26683E}" presName="Name19" presStyleLbl="parChTrans1D3" presStyleIdx="1" presStyleCnt="2"/>
       <dgm:spPr/>
+      <dgm:t>
+        <a:bodyPr/>
+        <a:lstStyle/>
+        <a:p>
+          <a:endParaRPr lang="en-US"/>
+        </a:p>
+      </dgm:t>
     </dgm:pt>
     <dgm:pt modelId="{66B81647-2209-4A81-BED9-D4804B98B78E}" type="pres">
       <dgm:prSet presAssocID="{1E04BBD0-D456-476B-A19C-9A84CFF9EACD}" presName="Name21" presStyleCnt="0"/>
@@ -1166,6 +1194,13 @@
     <dgm:pt modelId="{DC49711A-1617-4870-99F9-EBD94A886257}" type="pres">
       <dgm:prSet presAssocID="{1E04BBD0-D456-476B-A19C-9A84CFF9EACD}" presName="level2Shape" presStyleLbl="node3" presStyleIdx="1" presStyleCnt="2"/>
       <dgm:spPr/>
+      <dgm:t>
+        <a:bodyPr/>
+        <a:lstStyle/>
+        <a:p>
+          <a:endParaRPr lang="en-US"/>
+        </a:p>
+      </dgm:t>
     </dgm:pt>
     <dgm:pt modelId="{1127415B-CA69-4B97-88FD-D8B73973865C}" type="pres">
       <dgm:prSet presAssocID="{1E04BBD0-D456-476B-A19C-9A84CFF9EACD}" presName="hierChild3" presStyleCnt="0"/>
@@ -1174,6 +1209,13 @@
     <dgm:pt modelId="{83BAB16E-1F34-4BCE-BF7E-352D09554432}" type="pres">
       <dgm:prSet presAssocID="{0AEB82D2-CAA6-43CD-89D1-F57D70F440F4}" presName="Name19" presStyleLbl="parChTrans1D2" presStyleIdx="1" presStyleCnt="2"/>
       <dgm:spPr/>
+      <dgm:t>
+        <a:bodyPr/>
+        <a:lstStyle/>
+        <a:p>
+          <a:endParaRPr lang="en-US"/>
+        </a:p>
+      </dgm:t>
     </dgm:pt>
     <dgm:pt modelId="{B806DEC5-9492-4C5D-BD02-B836412DE5FF}" type="pres">
       <dgm:prSet presAssocID="{7576E4A3-A4C8-4D9E-ACDD-6BC23DE991C5}" presName="Name21" presStyleCnt="0"/>
@@ -1182,6 +1224,13 @@
     <dgm:pt modelId="{8387B25E-1F86-4ECB-A6BD-C39E1E774801}" type="pres">
       <dgm:prSet presAssocID="{7576E4A3-A4C8-4D9E-ACDD-6BC23DE991C5}" presName="level2Shape" presStyleLbl="node2" presStyleIdx="1" presStyleCnt="2"/>
       <dgm:spPr/>
+      <dgm:t>
+        <a:bodyPr/>
+        <a:lstStyle/>
+        <a:p>
+          <a:endParaRPr lang="en-US"/>
+        </a:p>
+      </dgm:t>
     </dgm:pt>
     <dgm:pt modelId="{E81BDE9B-B8FC-41A5-A80F-9D479B756EFE}" type="pres">
       <dgm:prSet presAssocID="{7576E4A3-A4C8-4D9E-ACDD-6BC23DE991C5}" presName="hierChild3" presStyleCnt="0"/>
@@ -1196,8 +1245,8 @@
     <dgm:cxn modelId="{5671352C-C4DC-4638-BA24-162D61C83EEF}" type="presOf" srcId="{3F7AB8E9-AEA2-49CF-8537-B54574EACA12}" destId="{DDF0EA6C-5C86-490E-BD53-BC8AD56E27B3}" srcOrd="0" destOrd="0" presId="urn:microsoft.com/office/officeart/2005/8/layout/hierarchy6"/>
     <dgm:cxn modelId="{F5BA8D54-FD8A-4604-B328-4C0C3B20CB21}" type="presOf" srcId="{9F56981F-FF5D-4AF3-8A6D-2ED84676BE9C}" destId="{058F317F-BFF4-4FE7-BAA6-B097C22EA615}" srcOrd="0" destOrd="0" presId="urn:microsoft.com/office/officeart/2005/8/layout/hierarchy6"/>
     <dgm:cxn modelId="{D84CD969-09C1-4FD4-BAEF-AB583CD003E2}" type="presOf" srcId="{99D62E16-FC9D-4748-985E-E9964D26683E}" destId="{041744E7-3F2E-461A-AE9D-1BB6348C0A89}" srcOrd="0" destOrd="0" presId="urn:microsoft.com/office/officeart/2005/8/layout/hierarchy6"/>
+    <dgm:cxn modelId="{4FA1D425-344C-436C-952D-DA221BF6D397}" type="presOf" srcId="{7576E4A3-A4C8-4D9E-ACDD-6BC23DE991C5}" destId="{8387B25E-1F86-4ECB-A6BD-C39E1E774801}" srcOrd="0" destOrd="0" presId="urn:microsoft.com/office/officeart/2005/8/layout/hierarchy6"/>
     <dgm:cxn modelId="{2CCD6381-8A81-4EF2-9CC9-29605D0610F6}" srcId="{3F7AB8E9-AEA2-49CF-8537-B54574EACA12}" destId="{31838588-A327-4AF4-B1F3-95A2075248F8}" srcOrd="0" destOrd="0" parTransId="{1B89235B-AD92-4C1B-986B-C3610BA4F281}" sibTransId="{52659DD1-6A84-413C-9A8F-49AC906171ED}"/>
-    <dgm:cxn modelId="{4FA1D425-344C-436C-952D-DA221BF6D397}" type="presOf" srcId="{7576E4A3-A4C8-4D9E-ACDD-6BC23DE991C5}" destId="{8387B25E-1F86-4ECB-A6BD-C39E1E774801}" srcOrd="0" destOrd="0" presId="urn:microsoft.com/office/officeart/2005/8/layout/hierarchy6"/>
     <dgm:cxn modelId="{4F95A147-D0E9-4E29-B7F4-145303ACF5A9}" type="presOf" srcId="{31838588-A327-4AF4-B1F3-95A2075248F8}" destId="{FD83F947-A91C-4407-BFB1-2D778F7C3BDD}" srcOrd="0" destOrd="0" presId="urn:microsoft.com/office/officeart/2005/8/layout/hierarchy6"/>
     <dgm:cxn modelId="{EE86FDA9-73D7-45EF-86AC-73F6EC94FBAB}" type="presOf" srcId="{1E04BBD0-D456-476B-A19C-9A84CFF9EACD}" destId="{DC49711A-1617-4870-99F9-EBD94A886257}" srcOrd="0" destOrd="0" presId="urn:microsoft.com/office/officeart/2005/8/layout/hierarchy6"/>
     <dgm:cxn modelId="{D0577516-2EB2-4BF1-ABD4-F494FA275269}" srcId="{A71270D1-A4A2-4C8C-B42C-D296193FBBD1}" destId="{7576E4A3-A4C8-4D9E-ACDD-6BC23DE991C5}" srcOrd="1" destOrd="0" parTransId="{0AEB82D2-CAA6-43CD-89D1-F57D70F440F4}" sibTransId="{1EB5ACB9-98F9-401D-969D-A5540AECD99C}"/>
@@ -9009,8 +9058,13 @@
             </a:r>
             <a:r>
               <a:rPr lang="en-US" dirty="0" smtClean="0"/>
-              <a:t> of an actor: messages are sent to an abstract identity of an actor and are picked up by random instance.</a:t>
-            </a:r>
+              <a:t> of an actor: messages are sent to an abstract identity of an actor and are picked up by </a:t>
+            </a:r>
+            <a:r>
+              <a:rPr lang="en-US" dirty="0" smtClean="0"/>
+              <a:t>random instances.</a:t>
+            </a:r>
+            <a:endParaRPr lang="en-US" dirty="0" smtClean="0"/>
           </a:p>
           <a:p>
             <a:r>
@@ -9100,15 +9154,7 @@
           <a:p>
             <a:r>
               <a:rPr lang="en-US" sz="2500" dirty="0" smtClean="0"/>
-              <a:t>Continuation is an actor (</a:t>
-            </a:r>
-            <a:r>
-              <a:rPr lang="en-US" sz="2500" dirty="0" smtClean="0"/>
-              <a:t>continuator)</a:t>
-            </a:r>
-            <a:r>
-              <a:rPr lang="en-US" sz="2500" dirty="0" smtClean="0"/>
-              <a:t> whose task is to wait for the first actor and pass its result to the second.</a:t>
+              <a:t>Continuation is an actor (continuator) whose task is to wait for the first actor and pass its result to the second.</a:t>
             </a:r>
           </a:p>
         </p:txBody>
@@ -9298,15 +9344,62 @@
           <a:p>
             <a:r>
               <a:rPr lang="en-US" dirty="0" smtClean="0"/>
-              <a:t>In rare case of continuator death, continuation will be replayed and it will pick available* results from its actors.</a:t>
-            </a:r>
-          </a:p>
-          <a:p>
+              <a:t>In rare case of continuator death, continuation will be replayed and it will pick available* results from its </a:t>
+            </a:r>
             <a:r>
               <a:rPr lang="en-US" dirty="0" smtClean="0"/>
-              <a:t>When composed, the first continuator becomes the first actor of the second continuator</a:t>
+              <a:t>actors </a:t>
+            </a:r>
+            <a:r>
+              <a:rPr lang="en-US" smtClean="0"/>
+              <a:t>without replay</a:t>
+            </a:r>
+            <a:r>
+              <a:rPr lang="en-US" dirty="0" smtClean="0"/>
+              <a:t>.</a:t>
+            </a:r>
+            <a:endParaRPr lang="en-US" dirty="0" smtClean="0"/>
+          </a:p>
+          <a:p>
+            <a:r>
+              <a:rPr lang="en-US" dirty="0" smtClean="0"/>
+              <a:t>When composed, the first continuator becomes the first actor of the second </a:t>
+            </a:r>
+            <a:r>
+              <a:rPr lang="en-US" dirty="0" smtClean="0"/>
+              <a:t>continuator.</a:t>
             </a:r>
             <a:endParaRPr lang="en-US" dirty="0"/>
+          </a:p>
+        </p:txBody>
+      </p:sp>
+      <p:sp>
+        <p:nvSpPr>
+          <p:cNvPr id="6" name="TextBox 5"/>
+          <p:cNvSpPr txBox="1"/>
+          <p:nvPr/>
+        </p:nvSpPr>
+        <p:spPr>
+          <a:xfrm>
+            <a:off x="838200" y="5239434"/>
+            <a:ext cx="3657600" cy="584775"/>
+          </a:xfrm>
+          <a:prstGeom prst="rect">
+            <a:avLst/>
+          </a:prstGeom>
+          <a:noFill/>
+        </p:spPr>
+        <p:txBody>
+          <a:bodyPr wrap="square" rtlCol="0">
+            <a:spAutoFit/>
+          </a:bodyPr>
+          <a:lstStyle/>
+          <a:p>
+            <a:r>
+              <a:rPr lang="en-US" sz="1600" dirty="0" smtClean="0"/>
+              <a:t>* results are cached for a timeout specified in an actor definition</a:t>
+            </a:r>
+            <a:endParaRPr lang="en-US" sz="1600" dirty="0"/>
           </a:p>
         </p:txBody>
       </p:sp>

</xml_diff>